<commit_message>
ADDED EMAIL ID IN POSTER
</commit_message>
<xml_diff>
--- a/Priya_Final_Poster.pptx
+++ b/Priya_Final_Poster.pptx
@@ -1313,7 +1313,7 @@
           <a:p>
             <a:fld id="{E695B7AD-C0E4-4106-98F1-A426950388A1}" type="datetimeFigureOut">
               <a:rPr lang="en-US" smtClean="0"/>
-              <a:t>7/1/2019</a:t>
+              <a:t>7/2/2019</a:t>
             </a:fld>
             <a:endParaRPr lang="en-US"/>
           </a:p>
@@ -2398,7 +2398,11 @@
           <a:p>
             <a:r>
               <a:rPr lang="en-US" dirty="0" smtClean="0"/>
-              <a:t>Priyanka Galla</a:t>
+              <a:t>By: Priyanka Galla | Advisor: Dr. Nathan </a:t>
+            </a:r>
+            <a:r>
+              <a:rPr lang="en-US" dirty="0" err="1" smtClean="0"/>
+              <a:t>Eloe</a:t>
             </a:r>
             <a:endParaRPr lang="en-US" dirty="0"/>
           </a:p>
@@ -2426,7 +2430,7 @@
           <a:p>
             <a:r>
               <a:rPr lang="en-US" dirty="0" smtClean="0"/>
-              <a:t>Northwest Missouri State University</a:t>
+              <a:t>Email: s534884@nwmissouri.edu</a:t>
             </a:r>
             <a:endParaRPr lang="en-US" dirty="0"/>
           </a:p>

</xml_diff>